<commit_message>
Chap05: End of copy pasting. Need actual writing.
Warning: some copy-pasted part need rewriting!
</commit_message>
<xml_diff>
--- a/05-CrDyn/Pictures/PumpResults.pptx
+++ b/05-CrDyn/Pictures/PumpResults.pptx
@@ -192,7 +192,7 @@
           <a:p>
             <a:fld id="{846E01DE-34E9-49ED-964F-82AFB8FEED8D}" type="datetimeFigureOut">
               <a:rPr lang="en-US" smtClean="0"/>
-              <a:t>7/4/2017</a:t>
+              <a:t>9/12/2017</a:t>
             </a:fld>
             <a:endParaRPr lang="en-US"/>
           </a:p>
@@ -730,7 +730,7 @@
           <a:p>
             <a:fld id="{E8FDFF63-9793-40E2-8DBC-13016F069603}" type="datetimeFigureOut">
               <a:rPr lang="en-US" smtClean="0"/>
-              <a:t>7/4/2017</a:t>
+              <a:t>9/12/2017</a:t>
             </a:fld>
             <a:endParaRPr lang="en-US"/>
           </a:p>
@@ -900,7 +900,7 @@
           <a:p>
             <a:fld id="{E8FDFF63-9793-40E2-8DBC-13016F069603}" type="datetimeFigureOut">
               <a:rPr lang="en-US" smtClean="0"/>
-              <a:t>7/4/2017</a:t>
+              <a:t>9/12/2017</a:t>
             </a:fld>
             <a:endParaRPr lang="en-US"/>
           </a:p>
@@ -1080,7 +1080,7 @@
           <a:p>
             <a:fld id="{E8FDFF63-9793-40E2-8DBC-13016F069603}" type="datetimeFigureOut">
               <a:rPr lang="en-US" smtClean="0"/>
-              <a:t>7/4/2017</a:t>
+              <a:t>9/12/2017</a:t>
             </a:fld>
             <a:endParaRPr lang="en-US"/>
           </a:p>
@@ -1250,7 +1250,7 @@
           <a:p>
             <a:fld id="{E8FDFF63-9793-40E2-8DBC-13016F069603}" type="datetimeFigureOut">
               <a:rPr lang="en-US" smtClean="0"/>
-              <a:t>7/4/2017</a:t>
+              <a:t>9/12/2017</a:t>
             </a:fld>
             <a:endParaRPr lang="en-US"/>
           </a:p>
@@ -1496,7 +1496,7 @@
           <a:p>
             <a:fld id="{E8FDFF63-9793-40E2-8DBC-13016F069603}" type="datetimeFigureOut">
               <a:rPr lang="en-US" smtClean="0"/>
-              <a:t>7/4/2017</a:t>
+              <a:t>9/12/2017</a:t>
             </a:fld>
             <a:endParaRPr lang="en-US"/>
           </a:p>
@@ -1784,7 +1784,7 @@
           <a:p>
             <a:fld id="{E8FDFF63-9793-40E2-8DBC-13016F069603}" type="datetimeFigureOut">
               <a:rPr lang="en-US" smtClean="0"/>
-              <a:t>7/4/2017</a:t>
+              <a:t>9/12/2017</a:t>
             </a:fld>
             <a:endParaRPr lang="en-US"/>
           </a:p>
@@ -2206,7 +2206,7 @@
           <a:p>
             <a:fld id="{E8FDFF63-9793-40E2-8DBC-13016F069603}" type="datetimeFigureOut">
               <a:rPr lang="en-US" smtClean="0"/>
-              <a:t>7/4/2017</a:t>
+              <a:t>9/12/2017</a:t>
             </a:fld>
             <a:endParaRPr lang="en-US"/>
           </a:p>
@@ -2324,7 +2324,7 @@
           <a:p>
             <a:fld id="{E8FDFF63-9793-40E2-8DBC-13016F069603}" type="datetimeFigureOut">
               <a:rPr lang="en-US" smtClean="0"/>
-              <a:t>7/4/2017</a:t>
+              <a:t>9/12/2017</a:t>
             </a:fld>
             <a:endParaRPr lang="en-US"/>
           </a:p>
@@ -2419,7 +2419,7 @@
           <a:p>
             <a:fld id="{E8FDFF63-9793-40E2-8DBC-13016F069603}" type="datetimeFigureOut">
               <a:rPr lang="en-US" smtClean="0"/>
-              <a:t>7/4/2017</a:t>
+              <a:t>9/12/2017</a:t>
             </a:fld>
             <a:endParaRPr lang="en-US"/>
           </a:p>
@@ -2696,7 +2696,7 @@
           <a:p>
             <a:fld id="{E8FDFF63-9793-40E2-8DBC-13016F069603}" type="datetimeFigureOut">
               <a:rPr lang="en-US" smtClean="0"/>
-              <a:t>7/4/2017</a:t>
+              <a:t>9/12/2017</a:t>
             </a:fld>
             <a:endParaRPr lang="en-US"/>
           </a:p>
@@ -2949,7 +2949,7 @@
           <a:p>
             <a:fld id="{E8FDFF63-9793-40E2-8DBC-13016F069603}" type="datetimeFigureOut">
               <a:rPr lang="en-US" smtClean="0"/>
-              <a:t>7/4/2017</a:t>
+              <a:t>9/12/2017</a:t>
             </a:fld>
             <a:endParaRPr lang="en-US"/>
           </a:p>
@@ -3162,7 +3162,7 @@
           <a:p>
             <a:fld id="{E8FDFF63-9793-40E2-8DBC-13016F069603}" type="datetimeFigureOut">
               <a:rPr lang="en-US" smtClean="0"/>
-              <a:t>7/4/2017</a:t>
+              <a:t>9/12/2017</a:t>
             </a:fld>
             <a:endParaRPr lang="en-US"/>
           </a:p>
@@ -3811,7 +3811,7 @@
         </p:nvSpPr>
         <p:spPr>
           <a:xfrm>
-            <a:off x="9595296" y="4446587"/>
+            <a:off x="9595296" y="4374579"/>
             <a:ext cx="484428" cy="415498"/>
           </a:xfrm>
           <a:prstGeom prst="rect">
@@ -3826,7 +3826,7 @@
           <a:lstStyle/>
           <a:p>
             <a:r>
-              <a:rPr lang="fr-FR" smtClean="0">
+              <a:rPr lang="fr-FR" dirty="0" smtClean="0">
                 <a:latin typeface="Times New Roman" panose="02020603050405020304" pitchFamily="18" charset="0"/>
                 <a:cs typeface="Times New Roman" panose="02020603050405020304" pitchFamily="18" charset="0"/>
               </a:rPr>

</xml_diff>